<commit_message>
updated readme and added charts
</commit_message>
<xml_diff>
--- a/LHL – CAPSTONE.pptx
+++ b/LHL – CAPSTONE.pptx
@@ -10,6 +10,9 @@
     <p:sldId id="259" r:id="rId4"/>
     <p:sldId id="260" r:id="rId5"/>
     <p:sldId id="261" r:id="rId6"/>
+    <p:sldId id="262" r:id="rId7"/>
+    <p:sldId id="263" r:id="rId8"/>
+    <p:sldId id="264" r:id="rId9"/>
   </p:sldIdLst>
   <p:sldSz cx="12192000" cy="6858000"/>
   <p:notesSz cx="6858000" cy="9144000"/>
@@ -108,6 +111,11 @@
       </a:defRPr>
     </a:lvl9pPr>
   </p:defaultTextStyle>
+  <p:extLst>
+    <p:ext uri="{EFAFB233-063F-42B5-8137-9DF3F51BA10A}">
+      <p15:sldGuideLst xmlns:p15="http://schemas.microsoft.com/office/powerpoint/2012/main"/>
+    </p:ext>
+  </p:extLst>
 </p:presentation>
 </file>
 
@@ -296,7 +304,7 @@
           <a:p>
             <a:fld id="{0FB7CF4A-31B0-4E73-B1E5-56F1B67C2C74}" type="datetimeFigureOut">
               <a:rPr lang="en-US" smtClean="0"/>
-              <a:t>3/25/2024</a:t>
+              <a:t>3/26/2024</a:t>
             </a:fld>
             <a:endParaRPr lang="en-US"/>
           </a:p>
@@ -594,7 +602,7 @@
           <a:p>
             <a:fld id="{0FB7CF4A-31B0-4E73-B1E5-56F1B67C2C74}" type="datetimeFigureOut">
               <a:rPr lang="en-US" smtClean="0"/>
-              <a:t>3/25/2024</a:t>
+              <a:t>3/26/2024</a:t>
             </a:fld>
             <a:endParaRPr lang="en-US"/>
           </a:p>
@@ -786,7 +794,7 @@
           <a:p>
             <a:fld id="{0FB7CF4A-31B0-4E73-B1E5-56F1B67C2C74}" type="datetimeFigureOut">
               <a:rPr lang="en-US" smtClean="0"/>
-              <a:t>3/25/2024</a:t>
+              <a:t>3/26/2024</a:t>
             </a:fld>
             <a:endParaRPr lang="en-US"/>
           </a:p>
@@ -1047,7 +1055,7 @@
           <a:p>
             <a:fld id="{0FB7CF4A-31B0-4E73-B1E5-56F1B67C2C74}" type="datetimeFigureOut">
               <a:rPr lang="en-US" smtClean="0"/>
-              <a:t>3/25/2024</a:t>
+              <a:t>3/26/2024</a:t>
             </a:fld>
             <a:endParaRPr lang="en-US"/>
           </a:p>
@@ -1471,7 +1479,7 @@
           <a:p>
             <a:fld id="{0FB7CF4A-31B0-4E73-B1E5-56F1B67C2C74}" type="datetimeFigureOut">
               <a:rPr lang="en-US" smtClean="0"/>
-              <a:t>3/25/2024</a:t>
+              <a:t>3/26/2024</a:t>
             </a:fld>
             <a:endParaRPr lang="en-US"/>
           </a:p>
@@ -2008,7 +2016,7 @@
           <a:p>
             <a:fld id="{0FB7CF4A-31B0-4E73-B1E5-56F1B67C2C74}" type="datetimeFigureOut">
               <a:rPr lang="en-US" smtClean="0"/>
-              <a:t>3/25/2024</a:t>
+              <a:t>3/26/2024</a:t>
             </a:fld>
             <a:endParaRPr lang="en-US"/>
           </a:p>
@@ -2872,7 +2880,7 @@
           <a:p>
             <a:fld id="{0FB7CF4A-31B0-4E73-B1E5-56F1B67C2C74}" type="datetimeFigureOut">
               <a:rPr lang="en-US" smtClean="0"/>
-              <a:t>3/25/2024</a:t>
+              <a:t>3/26/2024</a:t>
             </a:fld>
             <a:endParaRPr lang="en-US"/>
           </a:p>
@@ -3042,7 +3050,7 @@
           <a:p>
             <a:fld id="{0FB7CF4A-31B0-4E73-B1E5-56F1B67C2C74}" type="datetimeFigureOut">
               <a:rPr lang="en-US" smtClean="0"/>
-              <a:t>3/25/2024</a:t>
+              <a:t>3/26/2024</a:t>
             </a:fld>
             <a:endParaRPr lang="en-US"/>
           </a:p>
@@ -3226,7 +3234,7 @@
           <a:p>
             <a:fld id="{0FB7CF4A-31B0-4E73-B1E5-56F1B67C2C74}" type="datetimeFigureOut">
               <a:rPr lang="en-US" smtClean="0"/>
-              <a:t>3/25/2024</a:t>
+              <a:t>3/26/2024</a:t>
             </a:fld>
             <a:endParaRPr lang="en-US"/>
           </a:p>
@@ -3396,7 +3404,7 @@
           <a:p>
             <a:fld id="{0FB7CF4A-31B0-4E73-B1E5-56F1B67C2C74}" type="datetimeFigureOut">
               <a:rPr lang="en-US" smtClean="0"/>
-              <a:t>3/25/2024</a:t>
+              <a:t>3/26/2024</a:t>
             </a:fld>
             <a:endParaRPr lang="en-US"/>
           </a:p>
@@ -3640,7 +3648,7 @@
           <a:p>
             <a:fld id="{0FB7CF4A-31B0-4E73-B1E5-56F1B67C2C74}" type="datetimeFigureOut">
               <a:rPr lang="en-US" smtClean="0"/>
-              <a:t>3/25/2024</a:t>
+              <a:t>3/26/2024</a:t>
             </a:fld>
             <a:endParaRPr lang="en-US"/>
           </a:p>
@@ -3876,7 +3884,7 @@
           <a:p>
             <a:fld id="{0FB7CF4A-31B0-4E73-B1E5-56F1B67C2C74}" type="datetimeFigureOut">
               <a:rPr lang="en-US" smtClean="0"/>
-              <a:t>3/25/2024</a:t>
+              <a:t>3/26/2024</a:t>
             </a:fld>
             <a:endParaRPr lang="en-US"/>
           </a:p>
@@ -4342,7 +4350,7 @@
           <a:p>
             <a:fld id="{0FB7CF4A-31B0-4E73-B1E5-56F1B67C2C74}" type="datetimeFigureOut">
               <a:rPr lang="en-US" smtClean="0"/>
-              <a:t>3/25/2024</a:t>
+              <a:t>3/26/2024</a:t>
             </a:fld>
             <a:endParaRPr lang="en-US"/>
           </a:p>
@@ -4460,7 +4468,7 @@
           <a:p>
             <a:fld id="{0FB7CF4A-31B0-4E73-B1E5-56F1B67C2C74}" type="datetimeFigureOut">
               <a:rPr lang="en-US" smtClean="0"/>
-              <a:t>3/25/2024</a:t>
+              <a:t>3/26/2024</a:t>
             </a:fld>
             <a:endParaRPr lang="en-US"/>
           </a:p>
@@ -4555,7 +4563,7 @@
           <a:p>
             <a:fld id="{0FB7CF4A-31B0-4E73-B1E5-56F1B67C2C74}" type="datetimeFigureOut">
               <a:rPr lang="en-US" smtClean="0"/>
-              <a:t>3/25/2024</a:t>
+              <a:t>3/26/2024</a:t>
             </a:fld>
             <a:endParaRPr lang="en-US"/>
           </a:p>
@@ -4810,7 +4818,7 @@
           <a:p>
             <a:fld id="{0FB7CF4A-31B0-4E73-B1E5-56F1B67C2C74}" type="datetimeFigureOut">
               <a:rPr lang="en-US" smtClean="0"/>
-              <a:t>3/25/2024</a:t>
+              <a:t>3/26/2024</a:t>
             </a:fld>
             <a:endParaRPr lang="en-US"/>
           </a:p>
@@ -5110,7 +5118,7 @@
           <a:p>
             <a:fld id="{0FB7CF4A-31B0-4E73-B1E5-56F1B67C2C74}" type="datetimeFigureOut">
               <a:rPr lang="en-US" smtClean="0"/>
-              <a:t>3/25/2024</a:t>
+              <a:t>3/26/2024</a:t>
             </a:fld>
             <a:endParaRPr lang="en-US"/>
           </a:p>
@@ -5344,7 +5352,7 @@
           <a:p>
             <a:fld id="{0FB7CF4A-31B0-4E73-B1E5-56F1B67C2C74}" type="datetimeFigureOut">
               <a:rPr lang="en-US" smtClean="0"/>
-              <a:t>3/25/2024</a:t>
+              <a:t>3/26/2024</a:t>
             </a:fld>
             <a:endParaRPr lang="en-US"/>
           </a:p>
@@ -7685,6 +7693,291 @@
 </p:sld>
 </file>
 
+<file path=ppt/slides/slide6.xml><?xml version="1.0" encoding="utf-8"?>
+<p:sld xmlns:a="http://schemas.openxmlformats.org/drawingml/2006/main" xmlns:r="http://schemas.openxmlformats.org/officeDocument/2006/relationships" xmlns:p="http://schemas.openxmlformats.org/presentationml/2006/main">
+  <p:cSld>
+    <p:spTree>
+      <p:nvGrpSpPr>
+        <p:cNvPr id="1" name=""/>
+        <p:cNvGrpSpPr/>
+        <p:nvPr/>
+      </p:nvGrpSpPr>
+      <p:grpSpPr>
+        <a:xfrm>
+          <a:off x="0" y="0"/>
+          <a:ext cx="0" cy="0"/>
+          <a:chOff x="0" y="0"/>
+          <a:chExt cx="0" cy="0"/>
+        </a:xfrm>
+      </p:grpSpPr>
+      <p:sp>
+        <p:nvSpPr>
+          <p:cNvPr id="2" name="Title 1">
+            <a:extLst>
+              <a:ext uri="{FF2B5EF4-FFF2-40B4-BE49-F238E27FC236}">
+                <a16:creationId xmlns:a16="http://schemas.microsoft.com/office/drawing/2014/main" id="{DC82551F-A188-FF6B-2D54-439BC50F9363}"/>
+              </a:ext>
+            </a:extLst>
+          </p:cNvPr>
+          <p:cNvSpPr>
+            <a:spLocks noGrp="1"/>
+          </p:cNvSpPr>
+          <p:nvPr>
+            <p:ph type="title"/>
+          </p:nvPr>
+        </p:nvSpPr>
+        <p:spPr/>
+        <p:txBody>
+          <a:bodyPr/>
+          <a:lstStyle/>
+          <a:p>
+            <a:r>
+              <a:rPr lang="en-US" dirty="0"/>
+              <a:t>Market Composition</a:t>
+            </a:r>
+          </a:p>
+        </p:txBody>
+      </p:sp>
+      <p:pic>
+        <p:nvPicPr>
+          <p:cNvPr id="5" name="Content Placeholder 4">
+            <a:extLst>
+              <a:ext uri="{FF2B5EF4-FFF2-40B4-BE49-F238E27FC236}">
+                <a16:creationId xmlns:a16="http://schemas.microsoft.com/office/drawing/2014/main" id="{E686F9AE-5654-382B-15A2-3527323595CC}"/>
+              </a:ext>
+            </a:extLst>
+          </p:cNvPr>
+          <p:cNvPicPr>
+            <a:picLocks noGrp="1" noChangeAspect="1"/>
+          </p:cNvPicPr>
+          <p:nvPr>
+            <p:ph idx="1"/>
+          </p:nvPr>
+        </p:nvPicPr>
+        <p:blipFill rotWithShape="1">
+          <a:blip r:embed="rId2">
+            <a:extLst>
+              <a:ext uri="{28A0092B-C50C-407E-A947-70E740481C1C}">
+                <a14:useLocalDpi xmlns:a14="http://schemas.microsoft.com/office/drawing/2010/main" val="0"/>
+              </a:ext>
+            </a:extLst>
+          </a:blip>
+          <a:srcRect l="18376" t="10278" r="17879" b="8298"/>
+          <a:stretch/>
+        </p:blipFill>
+        <p:spPr>
+          <a:xfrm>
+            <a:off x="3046070" y="1833575"/>
+            <a:ext cx="6099859" cy="4636673"/>
+          </a:xfrm>
+          <a:effectLst>
+            <a:outerShdw blurRad="25400" dir="17880000">
+              <a:srgbClr val="000000">
+                <a:alpha val="46000"/>
+              </a:srgbClr>
+            </a:outerShdw>
+            <a:softEdge rad="38100"/>
+          </a:effectLst>
+        </p:spPr>
+      </p:pic>
+    </p:spTree>
+    <p:extLst>
+      <p:ext uri="{BB962C8B-B14F-4D97-AF65-F5344CB8AC3E}">
+        <p14:creationId xmlns:p14="http://schemas.microsoft.com/office/powerpoint/2010/main" val="945811903"/>
+      </p:ext>
+    </p:extLst>
+  </p:cSld>
+  <p:clrMapOvr>
+    <a:masterClrMapping/>
+  </p:clrMapOvr>
+</p:sld>
+</file>
+
+<file path=ppt/slides/slide7.xml><?xml version="1.0" encoding="utf-8"?>
+<p:sld xmlns:a="http://schemas.openxmlformats.org/drawingml/2006/main" xmlns:r="http://schemas.openxmlformats.org/officeDocument/2006/relationships" xmlns:p="http://schemas.openxmlformats.org/presentationml/2006/main">
+  <p:cSld>
+    <p:spTree>
+      <p:nvGrpSpPr>
+        <p:cNvPr id="1" name=""/>
+        <p:cNvGrpSpPr/>
+        <p:nvPr/>
+      </p:nvGrpSpPr>
+      <p:grpSpPr>
+        <a:xfrm>
+          <a:off x="0" y="0"/>
+          <a:ext cx="0" cy="0"/>
+          <a:chOff x="0" y="0"/>
+          <a:chExt cx="0" cy="0"/>
+        </a:xfrm>
+      </p:grpSpPr>
+      <p:sp>
+        <p:nvSpPr>
+          <p:cNvPr id="2" name="Title 1">
+            <a:extLst>
+              <a:ext uri="{FF2B5EF4-FFF2-40B4-BE49-F238E27FC236}">
+                <a16:creationId xmlns:a16="http://schemas.microsoft.com/office/drawing/2014/main" id="{E0404782-784D-306C-8BC7-945DAC4C3F60}"/>
+              </a:ext>
+            </a:extLst>
+          </p:cNvPr>
+          <p:cNvSpPr>
+            <a:spLocks noGrp="1"/>
+          </p:cNvSpPr>
+          <p:nvPr>
+            <p:ph type="title"/>
+          </p:nvPr>
+        </p:nvSpPr>
+        <p:spPr/>
+        <p:txBody>
+          <a:bodyPr/>
+          <a:lstStyle/>
+          <a:p>
+            <a:r>
+              <a:rPr lang="en-US" dirty="0"/>
+              <a:t>Avg Price per unit by Week</a:t>
+            </a:r>
+          </a:p>
+        </p:txBody>
+      </p:sp>
+      <p:pic>
+        <p:nvPicPr>
+          <p:cNvPr id="5" name="Content Placeholder 4">
+            <a:extLst>
+              <a:ext uri="{FF2B5EF4-FFF2-40B4-BE49-F238E27FC236}">
+                <a16:creationId xmlns:a16="http://schemas.microsoft.com/office/drawing/2014/main" id="{9C612B76-BC7C-FD4C-D444-ED1795A5BEF7}"/>
+              </a:ext>
+            </a:extLst>
+          </p:cNvPr>
+          <p:cNvPicPr>
+            <a:picLocks noGrp="1" noChangeAspect="1"/>
+          </p:cNvPicPr>
+          <p:nvPr>
+            <p:ph idx="1"/>
+          </p:nvPr>
+        </p:nvPicPr>
+        <p:blipFill>
+          <a:blip r:embed="rId2">
+            <a:extLst>
+              <a:ext uri="{28A0092B-C50C-407E-A947-70E740481C1C}">
+                <a14:useLocalDpi xmlns:a14="http://schemas.microsoft.com/office/drawing/2010/main" val="0"/>
+              </a:ext>
+            </a:extLst>
+          </a:blip>
+          <a:stretch>
+            <a:fillRect/>
+          </a:stretch>
+        </p:blipFill>
+        <p:spPr>
+          <a:xfrm>
+            <a:off x="1516369" y="1404173"/>
+            <a:ext cx="9148614" cy="5453827"/>
+          </a:xfrm>
+          <a:effectLst>
+            <a:outerShdw blurRad="25400" dir="17880000">
+              <a:srgbClr val="000000">
+                <a:alpha val="46000"/>
+              </a:srgbClr>
+            </a:outerShdw>
+            <a:softEdge rad="38100"/>
+          </a:effectLst>
+        </p:spPr>
+      </p:pic>
+    </p:spTree>
+    <p:extLst>
+      <p:ext uri="{BB962C8B-B14F-4D97-AF65-F5344CB8AC3E}">
+        <p14:creationId xmlns:p14="http://schemas.microsoft.com/office/powerpoint/2010/main" val="1627026516"/>
+      </p:ext>
+    </p:extLst>
+  </p:cSld>
+  <p:clrMapOvr>
+    <a:masterClrMapping/>
+  </p:clrMapOvr>
+</p:sld>
+</file>
+
+<file path=ppt/slides/slide8.xml><?xml version="1.0" encoding="utf-8"?>
+<p:sld xmlns:a="http://schemas.openxmlformats.org/drawingml/2006/main" xmlns:r="http://schemas.openxmlformats.org/officeDocument/2006/relationships" xmlns:p="http://schemas.openxmlformats.org/presentationml/2006/main">
+  <p:cSld>
+    <p:spTree>
+      <p:nvGrpSpPr>
+        <p:cNvPr id="1" name=""/>
+        <p:cNvGrpSpPr/>
+        <p:nvPr/>
+      </p:nvGrpSpPr>
+      <p:grpSpPr>
+        <a:xfrm>
+          <a:off x="0" y="0"/>
+          <a:ext cx="0" cy="0"/>
+          <a:chOff x="0" y="0"/>
+          <a:chExt cx="0" cy="0"/>
+        </a:xfrm>
+      </p:grpSpPr>
+      <p:sp>
+        <p:nvSpPr>
+          <p:cNvPr id="2" name="Title 1">
+            <a:extLst>
+              <a:ext uri="{FF2B5EF4-FFF2-40B4-BE49-F238E27FC236}">
+                <a16:creationId xmlns:a16="http://schemas.microsoft.com/office/drawing/2014/main" id="{7C1791A1-C254-23CB-C2A4-EEFF697765D4}"/>
+              </a:ext>
+            </a:extLst>
+          </p:cNvPr>
+          <p:cNvSpPr>
+            <a:spLocks noGrp="1"/>
+          </p:cNvSpPr>
+          <p:nvPr>
+            <p:ph type="title"/>
+          </p:nvPr>
+        </p:nvSpPr>
+        <p:spPr/>
+        <p:txBody>
+          <a:bodyPr/>
+          <a:lstStyle/>
+          <a:p>
+            <a:r>
+              <a:rPr lang="en-US"/>
+              <a:t>Forecasting</a:t>
+            </a:r>
+            <a:endParaRPr lang="en-US" dirty="0"/>
+          </a:p>
+        </p:txBody>
+      </p:sp>
+      <p:sp>
+        <p:nvSpPr>
+          <p:cNvPr id="3" name="Content Placeholder 2">
+            <a:extLst>
+              <a:ext uri="{FF2B5EF4-FFF2-40B4-BE49-F238E27FC236}">
+                <a16:creationId xmlns:a16="http://schemas.microsoft.com/office/drawing/2014/main" id="{4DCB6032-E0A8-E01D-5F8E-CFA3FA1111E3}"/>
+              </a:ext>
+            </a:extLst>
+          </p:cNvPr>
+          <p:cNvSpPr>
+            <a:spLocks noGrp="1"/>
+          </p:cNvSpPr>
+          <p:nvPr>
+            <p:ph idx="1"/>
+          </p:nvPr>
+        </p:nvSpPr>
+        <p:spPr/>
+        <p:txBody>
+          <a:bodyPr/>
+          <a:lstStyle/>
+          <a:p>
+            <a:endParaRPr lang="en-US"/>
+          </a:p>
+        </p:txBody>
+      </p:sp>
+    </p:spTree>
+    <p:extLst>
+      <p:ext uri="{BB962C8B-B14F-4D97-AF65-F5344CB8AC3E}">
+        <p14:creationId xmlns:p14="http://schemas.microsoft.com/office/powerpoint/2010/main" val="2994938770"/>
+      </p:ext>
+    </p:extLst>
+  </p:cSld>
+  <p:clrMapOvr>
+    <a:masterClrMapping/>
+  </p:clrMapOvr>
+</p:sld>
+</file>
+
 <file path=ppt/theme/theme1.xml><?xml version="1.0" encoding="utf-8"?>
 <a:theme xmlns:a="http://schemas.openxmlformats.org/drawingml/2006/main" name="Slate">
   <a:themeElements>

</xml_diff>